<commit_message>
Added pictures to presentation
</commit_message>
<xml_diff>
--- a/docs/CSE222A Group 6 Poster Draft.pptx
+++ b/docs/CSE222A Group 6 Poster Draft.pptx
@@ -106,7 +106,7 @@
   </p:defaultTextStyle>
   <p:extLst>
     <p:ext uri="{EFAFB233-063F-42B5-8137-9DF3F51BA10A}">
-      <p15:sldGuideLst xmlns:p15="http://schemas.microsoft.com/office/powerpoint/2012/main" xmlns=""/>
+      <p15:sldGuideLst xmlns="" xmlns:p15="http://schemas.microsoft.com/office/powerpoint/2012/main"/>
     </p:ext>
   </p:extLst>
 </p:presentation>
@@ -243,7 +243,7 @@
           <a:p>
             <a:fld id="{8D6B9C2D-6B06-468D-94AD-80AD408E1808}" type="datetimeFigureOut">
               <a:rPr lang="en-US" smtClean="0"/>
-              <a:t>01/12/15</a:t>
+              <a:t>04/12/15</a:t>
             </a:fld>
             <a:endParaRPr lang="en-US"/>
           </a:p>
@@ -413,7 +413,7 @@
           <a:p>
             <a:fld id="{8D6B9C2D-6B06-468D-94AD-80AD408E1808}" type="datetimeFigureOut">
               <a:rPr lang="en-US" smtClean="0"/>
-              <a:t>01/12/15</a:t>
+              <a:t>04/12/15</a:t>
             </a:fld>
             <a:endParaRPr lang="en-US"/>
           </a:p>
@@ -593,7 +593,7 @@
           <a:p>
             <a:fld id="{8D6B9C2D-6B06-468D-94AD-80AD408E1808}" type="datetimeFigureOut">
               <a:rPr lang="en-US" smtClean="0"/>
-              <a:t>01/12/15</a:t>
+              <a:t>04/12/15</a:t>
             </a:fld>
             <a:endParaRPr lang="en-US"/>
           </a:p>
@@ -763,7 +763,7 @@
           <a:p>
             <a:fld id="{8D6B9C2D-6B06-468D-94AD-80AD408E1808}" type="datetimeFigureOut">
               <a:rPr lang="en-US" smtClean="0"/>
-              <a:t>01/12/15</a:t>
+              <a:t>04/12/15</a:t>
             </a:fld>
             <a:endParaRPr lang="en-US"/>
           </a:p>
@@ -1009,7 +1009,7 @@
           <a:p>
             <a:fld id="{8D6B9C2D-6B06-468D-94AD-80AD408E1808}" type="datetimeFigureOut">
               <a:rPr lang="en-US" smtClean="0"/>
-              <a:t>01/12/15</a:t>
+              <a:t>04/12/15</a:t>
             </a:fld>
             <a:endParaRPr lang="en-US"/>
           </a:p>
@@ -1241,7 +1241,7 @@
           <a:p>
             <a:fld id="{8D6B9C2D-6B06-468D-94AD-80AD408E1808}" type="datetimeFigureOut">
               <a:rPr lang="en-US" smtClean="0"/>
-              <a:t>01/12/15</a:t>
+              <a:t>04/12/15</a:t>
             </a:fld>
             <a:endParaRPr lang="en-US"/>
           </a:p>
@@ -1608,7 +1608,7 @@
           <a:p>
             <a:fld id="{8D6B9C2D-6B06-468D-94AD-80AD408E1808}" type="datetimeFigureOut">
               <a:rPr lang="en-US" smtClean="0"/>
-              <a:t>01/12/15</a:t>
+              <a:t>04/12/15</a:t>
             </a:fld>
             <a:endParaRPr lang="en-US"/>
           </a:p>
@@ -1726,7 +1726,7 @@
           <a:p>
             <a:fld id="{8D6B9C2D-6B06-468D-94AD-80AD408E1808}" type="datetimeFigureOut">
               <a:rPr lang="en-US" smtClean="0"/>
-              <a:t>01/12/15</a:t>
+              <a:t>04/12/15</a:t>
             </a:fld>
             <a:endParaRPr lang="en-US"/>
           </a:p>
@@ -1821,7 +1821,7 @@
           <a:p>
             <a:fld id="{8D6B9C2D-6B06-468D-94AD-80AD408E1808}" type="datetimeFigureOut">
               <a:rPr lang="en-US" smtClean="0"/>
-              <a:t>01/12/15</a:t>
+              <a:t>04/12/15</a:t>
             </a:fld>
             <a:endParaRPr lang="en-US"/>
           </a:p>
@@ -2098,7 +2098,7 @@
           <a:p>
             <a:fld id="{8D6B9C2D-6B06-468D-94AD-80AD408E1808}" type="datetimeFigureOut">
               <a:rPr lang="en-US" smtClean="0"/>
-              <a:t>01/12/15</a:t>
+              <a:t>04/12/15</a:t>
             </a:fld>
             <a:endParaRPr lang="en-US"/>
           </a:p>
@@ -2351,7 +2351,7 @@
           <a:p>
             <a:fld id="{8D6B9C2D-6B06-468D-94AD-80AD408E1808}" type="datetimeFigureOut">
               <a:rPr lang="en-US" smtClean="0"/>
-              <a:t>01/12/15</a:t>
+              <a:t>04/12/15</a:t>
             </a:fld>
             <a:endParaRPr lang="en-US"/>
           </a:p>
@@ -2564,7 +2564,7 @@
           <a:p>
             <a:fld id="{8D6B9C2D-6B06-468D-94AD-80AD408E1808}" type="datetimeFigureOut">
               <a:rPr lang="en-US" smtClean="0"/>
-              <a:t>01/12/15</a:t>
+              <a:t>04/12/15</a:t>
             </a:fld>
             <a:endParaRPr lang="en-US"/>
           </a:p>
@@ -4008,7 +4008,7 @@
       </p:sp>
       <p:pic>
         <p:nvPicPr>
-          <p:cNvPr id="6" name="Изображение 5" descr="Coflow system - Poster-Stack (2).png"/>
+          <p:cNvPr id="2" name="Изображение 1" descr="Coflow system - Poster-Stack (Copy).png"/>
           <p:cNvPicPr>
             <a:picLocks noChangeAspect="1"/>
           </p:cNvPicPr>
@@ -4028,8 +4028,38 @@
         </p:blipFill>
         <p:spPr>
           <a:xfrm>
-            <a:off x="4203700" y="1155700"/>
-            <a:ext cx="3846027" cy="1943100"/>
+            <a:off x="4234482" y="937004"/>
+            <a:ext cx="3848032" cy="2453469"/>
+          </a:xfrm>
+          <a:prstGeom prst="rect">
+            <a:avLst/>
+          </a:prstGeom>
+        </p:spPr>
+      </p:pic>
+      <p:pic>
+        <p:nvPicPr>
+          <p:cNvPr id="5" name="Изображение 4" descr="Coflow system - Poster-Communication.png"/>
+          <p:cNvPicPr>
+            <a:picLocks noChangeAspect="1"/>
+          </p:cNvPicPr>
+          <p:nvPr/>
+        </p:nvPicPr>
+        <p:blipFill>
+          <a:blip r:embed="rId3" cstate="print">
+            <a:extLst>
+              <a:ext uri="{28A0092B-C50C-407E-A947-70E740481C1C}">
+                <a14:useLocalDpi xmlns:a14="http://schemas.microsoft.com/office/drawing/2010/main" val="0"/>
+              </a:ext>
+            </a:extLst>
+          </a:blip>
+          <a:stretch>
+            <a:fillRect/>
+          </a:stretch>
+        </p:blipFill>
+        <p:spPr>
+          <a:xfrm>
+            <a:off x="4189522" y="3638497"/>
+            <a:ext cx="3837775" cy="2849632"/>
           </a:xfrm>
           <a:prstGeom prst="rect">
             <a:avLst/>
@@ -4311,7 +4341,7 @@
   <a:extraClrSchemeLst/>
   <a:extLst>
     <a:ext uri="{05A4C25C-085E-4340-85A3-A5531E510DB2}">
-      <thm15:themeFamily xmlns:thm15="http://schemas.microsoft.com/office/thememl/2012/main" xmlns="" name="Office Theme" id="{62F939B6-93AF-4DB8-9C6B-D6C7DFDC589F}" vid="{4A3C46E8-61CC-4603-A589-7422A47A8E4A}"/>
+      <thm15:themeFamily xmlns="" xmlns:thm15="http://schemas.microsoft.com/office/thememl/2012/main" name="Office Theme" id="{62F939B6-93AF-4DB8-9C6B-D6C7DFDC589F}" vid="{4A3C46E8-61CC-4603-A589-7422A47A8E4A}"/>
     </a:ext>
   </a:extLst>
 </a:theme>

</xml_diff>